<commit_message>
Finished Spotty Chapter 19/08
Finished Spotty Chapter 19/08
</commit_message>
<xml_diff>
--- a/Presentation1.pptx
+++ b/Presentation1.pptx
@@ -107,6 +107,11 @@
       </a:defRPr>
     </a:lvl9pPr>
   </p:defaultTextStyle>
+  <p:extLst>
+    <p:ext uri="{EFAFB233-063F-42B5-8137-9DF3F51BA10A}">
+      <p15:sldGuideLst xmlns:p15="http://schemas.microsoft.com/office/powerpoint/2012/main"/>
+    </p:ext>
+  </p:extLst>
 </p:presentation>
 </file>
 
@@ -241,7 +246,7 @@
           <a:p>
             <a:fld id="{8CE8BACC-6A40-4DB3-9C50-B7E5A82550AF}" type="datetimeFigureOut">
               <a:rPr lang="en-GB" smtClean="0"/>
-              <a:t>16/07/2016</a:t>
+              <a:t>16/08/2016</a:t>
             </a:fld>
             <a:endParaRPr lang="en-GB"/>
           </a:p>
@@ -411,7 +416,7 @@
           <a:p>
             <a:fld id="{8CE8BACC-6A40-4DB3-9C50-B7E5A82550AF}" type="datetimeFigureOut">
               <a:rPr lang="en-GB" smtClean="0"/>
-              <a:t>16/07/2016</a:t>
+              <a:t>16/08/2016</a:t>
             </a:fld>
             <a:endParaRPr lang="en-GB"/>
           </a:p>
@@ -591,7 +596,7 @@
           <a:p>
             <a:fld id="{8CE8BACC-6A40-4DB3-9C50-B7E5A82550AF}" type="datetimeFigureOut">
               <a:rPr lang="en-GB" smtClean="0"/>
-              <a:t>16/07/2016</a:t>
+              <a:t>16/08/2016</a:t>
             </a:fld>
             <a:endParaRPr lang="en-GB"/>
           </a:p>
@@ -761,7 +766,7 @@
           <a:p>
             <a:fld id="{8CE8BACC-6A40-4DB3-9C50-B7E5A82550AF}" type="datetimeFigureOut">
               <a:rPr lang="en-GB" smtClean="0"/>
-              <a:t>16/07/2016</a:t>
+              <a:t>16/08/2016</a:t>
             </a:fld>
             <a:endParaRPr lang="en-GB"/>
           </a:p>
@@ -1007,7 +1012,7 @@
           <a:p>
             <a:fld id="{8CE8BACC-6A40-4DB3-9C50-B7E5A82550AF}" type="datetimeFigureOut">
               <a:rPr lang="en-GB" smtClean="0"/>
-              <a:t>16/07/2016</a:t>
+              <a:t>16/08/2016</a:t>
             </a:fld>
             <a:endParaRPr lang="en-GB"/>
           </a:p>
@@ -1239,7 +1244,7 @@
           <a:p>
             <a:fld id="{8CE8BACC-6A40-4DB3-9C50-B7E5A82550AF}" type="datetimeFigureOut">
               <a:rPr lang="en-GB" smtClean="0"/>
-              <a:t>16/07/2016</a:t>
+              <a:t>16/08/2016</a:t>
             </a:fld>
             <a:endParaRPr lang="en-GB"/>
           </a:p>
@@ -1606,7 +1611,7 @@
           <a:p>
             <a:fld id="{8CE8BACC-6A40-4DB3-9C50-B7E5A82550AF}" type="datetimeFigureOut">
               <a:rPr lang="en-GB" smtClean="0"/>
-              <a:t>16/07/2016</a:t>
+              <a:t>16/08/2016</a:t>
             </a:fld>
             <a:endParaRPr lang="en-GB"/>
           </a:p>
@@ -1724,7 +1729,7 @@
           <a:p>
             <a:fld id="{8CE8BACC-6A40-4DB3-9C50-B7E5A82550AF}" type="datetimeFigureOut">
               <a:rPr lang="en-GB" smtClean="0"/>
-              <a:t>16/07/2016</a:t>
+              <a:t>16/08/2016</a:t>
             </a:fld>
             <a:endParaRPr lang="en-GB"/>
           </a:p>
@@ -1819,7 +1824,7 @@
           <a:p>
             <a:fld id="{8CE8BACC-6A40-4DB3-9C50-B7E5A82550AF}" type="datetimeFigureOut">
               <a:rPr lang="en-GB" smtClean="0"/>
-              <a:t>16/07/2016</a:t>
+              <a:t>16/08/2016</a:t>
             </a:fld>
             <a:endParaRPr lang="en-GB"/>
           </a:p>
@@ -2096,7 +2101,7 @@
           <a:p>
             <a:fld id="{8CE8BACC-6A40-4DB3-9C50-B7E5A82550AF}" type="datetimeFigureOut">
               <a:rPr lang="en-GB" smtClean="0"/>
-              <a:t>16/07/2016</a:t>
+              <a:t>16/08/2016</a:t>
             </a:fld>
             <a:endParaRPr lang="en-GB"/>
           </a:p>
@@ -2349,7 +2354,7 @@
           <a:p>
             <a:fld id="{8CE8BACC-6A40-4DB3-9C50-B7E5A82550AF}" type="datetimeFigureOut">
               <a:rPr lang="en-GB" smtClean="0"/>
-              <a:t>16/07/2016</a:t>
+              <a:t>16/08/2016</a:t>
             </a:fld>
             <a:endParaRPr lang="en-GB"/>
           </a:p>
@@ -2562,7 +2567,7 @@
           <a:p>
             <a:fld id="{8CE8BACC-6A40-4DB3-9C50-B7E5A82550AF}" type="datetimeFigureOut">
               <a:rPr lang="en-GB" smtClean="0"/>
-              <a:t>16/07/2016</a:t>
+              <a:t>16/08/2016</a:t>
             </a:fld>
             <a:endParaRPr lang="en-GB"/>
           </a:p>
@@ -3560,14 +3565,14 @@
             <a:r>
               <a:rPr lang="en-GB" dirty="0" smtClean="0">
                 <a:solidFill>
-                  <a:schemeClr val="tx1"/>
+                  <a:schemeClr val="bg1"/>
                 </a:solidFill>
               </a:rPr>
               <a:t>)</a:t>
             </a:r>
             <a:endParaRPr lang="en-GB" dirty="0">
               <a:solidFill>
-                <a:schemeClr val="tx1"/>
+                <a:schemeClr val="bg1"/>
               </a:solidFill>
             </a:endParaRPr>
           </a:p>

</xml_diff>